<commit_message>
made some modifications in name and contents of informative presentation for the project
</commit_message>
<xml_diff>
--- a/TechiNar Series-Unit Testing Frameworks Demo.pptx
+++ b/TechiNar Series-Unit Testing Frameworks Demo.pptx
@@ -6678,8 +6678,12 @@
               <a:t>th</a:t>
             </a:r>
             <a:r>
-              <a:rPr lang="en-US" sz="1600" dirty="0" smtClean="0"/>
-              <a:t>, 2014</a:t>
+              <a:rPr lang="en-US" sz="1600" smtClean="0"/>
+              <a:t>, </a:t>
+            </a:r>
+            <a:r>
+              <a:rPr lang="en-US" sz="1600" smtClean="0"/>
+              <a:t>2014 </a:t>
             </a:r>
             <a:endParaRPr lang="en-US" sz="1600" dirty="0"/>
           </a:p>
@@ -7673,11 +7677,7 @@
           <a:p>
             <a:r>
               <a:rPr lang="en-US" sz="2800" dirty="0" smtClean="0"/>
-              <a:t>NEW </a:t>
-            </a:r>
-            <a:r>
-              <a:rPr lang="en-US" sz="2800" dirty="0" smtClean="0"/>
-              <a:t>FEATURES BY </a:t>
+              <a:t>NEW FEATURES BY </a:t>
             </a:r>
             <a:r>
               <a:rPr lang="en-US" sz="2800" dirty="0" err="1" smtClean="0"/>
@@ -11565,11 +11565,7 @@
           <a:p>
             <a:r>
               <a:rPr lang="en-US" sz="2400" dirty="0" smtClean="0"/>
-              <a:t>New </a:t>
-            </a:r>
-            <a:r>
-              <a:rPr lang="en-US" sz="2400" dirty="0" smtClean="0"/>
-              <a:t>Features provided by </a:t>
+              <a:t>New Features provided by </a:t>
             </a:r>
             <a:r>
               <a:rPr lang="en-US" sz="2400" dirty="0" err="1" smtClean="0"/>
@@ -11579,7 +11575,6 @@
               <a:rPr lang="en-US" sz="2400" dirty="0" smtClean="0"/>
               <a:t> 4</a:t>
             </a:r>
-            <a:endParaRPr lang="en-US" sz="2400" dirty="0" smtClean="0"/>
           </a:p>
           <a:p>
             <a:r>

</xml_diff>